<commit_message>
change erd and some models, add slugs
</commit_message>
<xml_diff>
--- a/preview.pptx
+++ b/preview.pptx
@@ -5454,8 +5454,7 @@
       <dgm:spPr>
         <a:solidFill>
           <a:schemeClr val="accent1">
-            <a:lumMod val="40000"/>
-            <a:lumOff val="60000"/>
+            <a:lumMod val="75000"/>
           </a:schemeClr>
         </a:solidFill>
       </dgm:spPr>
@@ -5498,8 +5497,7 @@
       <dgm:spPr>
         <a:solidFill>
           <a:schemeClr val="accent1">
-            <a:lumMod val="40000"/>
-            <a:lumOff val="60000"/>
+            <a:lumMod val="75000"/>
           </a:schemeClr>
         </a:solidFill>
       </dgm:spPr>
@@ -5541,8 +5539,7 @@
       <dgm:spPr>
         <a:solidFill>
           <a:schemeClr val="accent1">
-            <a:lumMod val="40000"/>
-            <a:lumOff val="60000"/>
+            <a:lumMod val="75000"/>
           </a:schemeClr>
         </a:solidFill>
       </dgm:spPr>
@@ -5584,8 +5581,7 @@
       <dgm:spPr>
         <a:solidFill>
           <a:schemeClr val="accent1">
-            <a:lumMod val="40000"/>
-            <a:lumOff val="60000"/>
+            <a:lumMod val="75000"/>
           </a:schemeClr>
         </a:solidFill>
       </dgm:spPr>
@@ -5974,7 +5970,7 @@
       <dgm:spPr/>
     </dgm:pt>
     <dgm:pt modelId="{6440870E-EBF2-44F9-8A0D-41CA35426B06}" type="pres">
-      <dgm:prSet presAssocID="{4AE3CF07-97E5-4D04-81DF-4C845751BFA0}" presName="LevelTwoTextNode" presStyleLbl="node3" presStyleIdx="1" presStyleCnt="13" custScaleX="121607" custLinFactX="-141533" custLinFactNeighborX="-200000" custLinFactNeighborY="52680">
+      <dgm:prSet presAssocID="{4AE3CF07-97E5-4D04-81DF-4C845751BFA0}" presName="LevelTwoTextNode" presStyleLbl="node3" presStyleIdx="1" presStyleCnt="13" custScaleX="182398" custLinFactX="-141533" custLinFactNeighborX="-200000" custLinFactNeighborY="52680">
         <dgm:presLayoutVars>
           <dgm:chPref val="3"/>
         </dgm:presLayoutVars>
@@ -5998,7 +5994,7 @@
       <dgm:spPr/>
     </dgm:pt>
     <dgm:pt modelId="{94BA63BE-4120-48E6-8D53-2666FCDDE5CB}" type="pres">
-      <dgm:prSet presAssocID="{F83492F2-1F01-4DE7-A308-7CD00BD835CE}" presName="LevelTwoTextNode" presStyleLbl="node3" presStyleIdx="2" presStyleCnt="13" custScaleX="119535" custLinFactX="-141533" custLinFactNeighborX="-200000" custLinFactNeighborY="52680">
+      <dgm:prSet presAssocID="{F83492F2-1F01-4DE7-A308-7CD00BD835CE}" presName="LevelTwoTextNode" presStyleLbl="node3" presStyleIdx="2" presStyleCnt="13" custScaleX="182150" custLinFactX="-141533" custLinFactNeighborX="-200000" custLinFactNeighborY="52680">
         <dgm:presLayoutVars>
           <dgm:chPref val="3"/>
         </dgm:presLayoutVars>
@@ -6022,7 +6018,7 @@
       <dgm:spPr/>
     </dgm:pt>
     <dgm:pt modelId="{642D9CC1-E5C9-4321-9153-4CC6A80C2C47}" type="pres">
-      <dgm:prSet presAssocID="{0ADBE6DB-6ACB-4E34-B666-21C4F40736BF}" presName="LevelTwoTextNode" presStyleLbl="node3" presStyleIdx="3" presStyleCnt="13" custScaleX="121607" custLinFactX="-141533" custLinFactNeighborX="-200000" custLinFactNeighborY="52680">
+      <dgm:prSet presAssocID="{0ADBE6DB-6ACB-4E34-B666-21C4F40736BF}" presName="LevelTwoTextNode" presStyleLbl="node3" presStyleIdx="3" presStyleCnt="13" custScaleX="179552" custLinFactX="-141533" custLinFactNeighborX="-200000" custLinFactNeighborY="52680">
         <dgm:presLayoutVars>
           <dgm:chPref val="3"/>
         </dgm:presLayoutVars>
@@ -6070,7 +6066,7 @@
       <dgm:spPr/>
     </dgm:pt>
     <dgm:pt modelId="{AEBF0B01-F414-4EC4-9E22-C0FA18A9F0EB}" type="pres">
-      <dgm:prSet presAssocID="{52A76253-62C2-4CCF-9629-FE767D0471C5}" presName="LevelTwoTextNode" presStyleLbl="node3" presStyleIdx="4" presStyleCnt="13" custScaleX="120807" custLinFactX="53946" custLinFactY="100000" custLinFactNeighborX="100000" custLinFactNeighborY="143479">
+      <dgm:prSet presAssocID="{52A76253-62C2-4CCF-9629-FE767D0471C5}" presName="LevelTwoTextNode" presStyleLbl="node3" presStyleIdx="4" presStyleCnt="13" custScaleX="240343" custLinFactX="53946" custLinFactY="100000" custLinFactNeighborX="100000" custLinFactNeighborY="120710">
         <dgm:presLayoutVars>
           <dgm:chPref val="3"/>
         </dgm:presLayoutVars>
@@ -6094,7 +6090,7 @@
       <dgm:spPr/>
     </dgm:pt>
     <dgm:pt modelId="{CFFD5694-0230-4178-BE2A-F8B71A28B4C6}" type="pres">
-      <dgm:prSet presAssocID="{B2C73DB5-86BB-4DFF-8788-AFAB79FFE01C}" presName="LevelTwoTextNode" presStyleLbl="node3" presStyleIdx="5" presStyleCnt="13" custScaleX="123082" custLinFactX="48480" custLinFactY="-112292" custLinFactNeighborX="100000" custLinFactNeighborY="-200000">
+      <dgm:prSet presAssocID="{B2C73DB5-86BB-4DFF-8788-AFAB79FFE01C}" presName="LevelTwoTextNode" presStyleLbl="node3" presStyleIdx="5" presStyleCnt="13" custScaleX="236089" custLinFactX="48480" custLinFactY="-112292" custLinFactNeighborX="100000" custLinFactNeighborY="-200000">
         <dgm:presLayoutVars>
           <dgm:chPref val="3"/>
         </dgm:presLayoutVars>
@@ -6118,7 +6114,7 @@
       <dgm:spPr/>
     </dgm:pt>
     <dgm:pt modelId="{42E15086-1FE8-4CB6-85EB-06567F912868}" type="pres">
-      <dgm:prSet presAssocID="{C5863AAE-9570-4610-B65B-68C9F2C2DDF2}" presName="LevelTwoTextNode" presStyleLbl="node3" presStyleIdx="6" presStyleCnt="13" custScaleX="113598" custLinFactX="59503" custLinFactY="35849" custLinFactNeighborX="100000" custLinFactNeighborY="100000">
+      <dgm:prSet presAssocID="{C5863AAE-9570-4610-B65B-68C9F2C2DDF2}" presName="LevelTwoTextNode" presStyleLbl="node3" presStyleIdx="6" presStyleCnt="13" custScaleX="233135" custLinFactX="59503" custLinFactY="15926" custLinFactNeighborX="100000" custLinFactNeighborY="100000">
         <dgm:presLayoutVars>
           <dgm:chPref val="3"/>
         </dgm:presLayoutVars>
@@ -6142,7 +6138,7 @@
       <dgm:spPr/>
     </dgm:pt>
     <dgm:pt modelId="{9DBE29E2-9F63-4A60-97C4-802CE647A739}" type="pres">
-      <dgm:prSet presAssocID="{8CC7BBE7-BA65-44DF-82B7-17CC47B16B47}" presName="LevelTwoTextNode" presStyleLbl="node3" presStyleIdx="7" presStyleCnt="13" custLinFactX="62898" custLinFactY="-200000" custLinFactNeighborX="100000" custLinFactNeighborY="-236950">
+      <dgm:prSet presAssocID="{8CC7BBE7-BA65-44DF-82B7-17CC47B16B47}" presName="LevelTwoTextNode" presStyleLbl="node3" presStyleIdx="7" presStyleCnt="13" custScaleX="238934" custLinFactX="48668" custLinFactY="-200000" custLinFactNeighborX="100000" custLinFactNeighborY="-245488">
         <dgm:presLayoutVars>
           <dgm:chPref val="3"/>
         </dgm:presLayoutVars>
@@ -6166,7 +6162,7 @@
       <dgm:spPr/>
     </dgm:pt>
     <dgm:pt modelId="{5D0532A0-3F1F-42AE-AA11-6D0F5E213FFA}" type="pres">
-      <dgm:prSet presAssocID="{CFC3498D-B204-42B0-997B-D92D8099E5A9}" presName="LevelTwoTextNode" presStyleLbl="node3" presStyleIdx="8" presStyleCnt="13" custLinFactX="62673" custLinFactY="-200000" custLinFactNeighborX="100000" custLinFactNeighborY="-251950">
+      <dgm:prSet presAssocID="{CFC3498D-B204-42B0-997B-D92D8099E5A9}" presName="LevelTwoTextNode" presStyleLbl="node3" presStyleIdx="8" presStyleCnt="13" custScaleX="240878" custLinFactX="49865" custLinFactY="-200000" custLinFactNeighborX="100000" custLinFactNeighborY="-251950">
         <dgm:presLayoutVars>
           <dgm:chPref val="3"/>
         </dgm:presLayoutVars>
@@ -6190,7 +6186,7 @@
       <dgm:spPr/>
     </dgm:pt>
     <dgm:pt modelId="{57B835F5-38A4-4C12-B76A-9FFFFA745CFB}" type="pres">
-      <dgm:prSet presAssocID="{55718A7C-87D5-4B8D-AAEF-DDA352154A88}" presName="LevelTwoTextNode" presStyleLbl="node3" presStyleIdx="9" presStyleCnt="13" custLinFactX="62673" custLinFactY="-200000" custLinFactNeighborX="100000" custLinFactNeighborY="-262443">
+      <dgm:prSet presAssocID="{55718A7C-87D5-4B8D-AAEF-DDA352154A88}" presName="LevelTwoTextNode" presStyleLbl="node3" presStyleIdx="9" presStyleCnt="13" custScaleX="242553" custLinFactX="48443" custLinFactY="-200000" custLinFactNeighborX="100000" custLinFactNeighborY="-262443">
         <dgm:presLayoutVars>
           <dgm:chPref val="3"/>
         </dgm:presLayoutVars>
@@ -6286,7 +6282,7 @@
       <dgm:spPr/>
     </dgm:pt>
     <dgm:pt modelId="{6FEA8E1F-3F0F-416E-B514-7EF49B3F6CAA}" type="pres">
-      <dgm:prSet presAssocID="{4A72BA09-E146-41B7-978E-EC6CB28FFA80}" presName="LevelTwoTextNode" presStyleLbl="node3" presStyleIdx="11" presStyleCnt="13" custScaleX="218399" custLinFactX="-100000" custLinFactY="-47137" custLinFactNeighborX="-171237" custLinFactNeighborY="-100000">
+      <dgm:prSet presAssocID="{4A72BA09-E146-41B7-978E-EC6CB28FFA80}" presName="LevelTwoTextNode" presStyleLbl="node3" presStyleIdx="11" presStyleCnt="13" custScaleX="228598" custLinFactX="-100000" custLinFactY="-47137" custLinFactNeighborX="-184045" custLinFactNeighborY="-100000">
         <dgm:presLayoutVars>
           <dgm:chPref val="3"/>
         </dgm:presLayoutVars>
@@ -6310,7 +6306,7 @@
       <dgm:spPr/>
     </dgm:pt>
     <dgm:pt modelId="{BEB48FE5-A300-4862-9406-3D8FE9CE9666}" type="pres">
-      <dgm:prSet presAssocID="{773C961C-8811-4C19-94B5-FB31AE30C705}" presName="LevelTwoTextNode" presStyleLbl="node3" presStyleIdx="12" presStyleCnt="13" custScaleX="172806" custLinFactX="-100000" custLinFactY="-31969" custLinFactNeighborX="-148820" custLinFactNeighborY="-100000">
+      <dgm:prSet presAssocID="{773C961C-8811-4C19-94B5-FB31AE30C705}" presName="LevelTwoTextNode" presStyleLbl="node3" presStyleIdx="12" presStyleCnt="13" custScaleX="227804" custLinFactX="-100000" custLinFactY="-31969" custLinFactNeighborX="-178704" custLinFactNeighborY="-100000">
         <dgm:presLayoutVars>
           <dgm:chPref val="3"/>
         </dgm:presLayoutVars>
@@ -12109,7 +12105,7 @@
       </dsp:nvSpPr>
       <dsp:spPr>
         <a:xfrm>
-          <a:off x="276268" y="2976491"/>
+          <a:off x="208292" y="2976491"/>
           <a:ext cx="1493883" cy="452508"/>
         </a:xfrm>
         <a:prstGeom prst="roundRect">
@@ -12178,7 +12174,7 @@
         </a:p>
       </dsp:txBody>
       <dsp:txXfrm>
-        <a:off x="289522" y="2989745"/>
+        <a:off x="221546" y="2989745"/>
         <a:ext cx="1467375" cy="426000"/>
       </dsp:txXfrm>
     </dsp:sp>
@@ -12189,7 +12185,7 @@
       </dsp:nvSpPr>
       <dsp:spPr>
         <a:xfrm rot="16655109">
-          <a:off x="815788" y="2106800"/>
+          <a:off x="747813" y="2106800"/>
           <a:ext cx="2198991" cy="12139"/>
         </a:xfrm>
         <a:custGeom>
@@ -12259,7 +12255,7 @@
         </a:p>
       </dsp:txBody>
       <dsp:txXfrm>
-        <a:off x="1860309" y="2057895"/>
+        <a:off x="1792334" y="2057895"/>
         <a:ext cx="109949" cy="109949"/>
       </dsp:txXfrm>
     </dsp:sp>
@@ -12270,7 +12266,7 @@
       </dsp:nvSpPr>
       <dsp:spPr>
         <a:xfrm>
-          <a:off x="2060417" y="796741"/>
+          <a:off x="1992441" y="796741"/>
           <a:ext cx="905016" cy="452508"/>
         </a:xfrm>
         <a:prstGeom prst="roundRect">
@@ -12337,7 +12333,7 @@
         </a:p>
       </dsp:txBody>
       <dsp:txXfrm>
-        <a:off x="2073671" y="809995"/>
+        <a:off x="2005695" y="809995"/>
         <a:ext cx="878508" cy="426000"/>
       </dsp:txXfrm>
     </dsp:sp>
@@ -12348,7 +12344,7 @@
       </dsp:nvSpPr>
       <dsp:spPr>
         <a:xfrm rot="19113455">
-          <a:off x="2861030" y="740938"/>
+          <a:off x="2793054" y="740938"/>
           <a:ext cx="833965" cy="12139"/>
         </a:xfrm>
         <a:custGeom>
@@ -12418,7 +12414,7 @@
         </a:p>
       </dsp:txBody>
       <dsp:txXfrm>
-        <a:off x="3257164" y="726159"/>
+        <a:off x="3189188" y="726159"/>
         <a:ext cx="41698" cy="41698"/>
       </dsp:txXfrm>
     </dsp:sp>
@@ -12429,7 +12425,7 @@
       </dsp:nvSpPr>
       <dsp:spPr>
         <a:xfrm>
-          <a:off x="3590592" y="244767"/>
+          <a:off x="3522616" y="244767"/>
           <a:ext cx="1647066" cy="452508"/>
         </a:xfrm>
         <a:prstGeom prst="roundRect">
@@ -12439,8 +12435,7 @@
         </a:prstGeom>
         <a:solidFill>
           <a:schemeClr val="accent1">
-            <a:lumMod val="40000"/>
-            <a:lumOff val="60000"/>
+            <a:lumMod val="75000"/>
           </a:schemeClr>
         </a:solidFill>
         <a:ln w="12700" cap="flat" cmpd="sng" algn="ctr">
@@ -12497,7 +12492,7 @@
         </a:p>
       </dsp:txBody>
       <dsp:txXfrm>
-        <a:off x="3603846" y="258021"/>
+        <a:off x="3535870" y="258021"/>
         <a:ext cx="1620558" cy="426000"/>
       </dsp:txXfrm>
     </dsp:sp>
@@ -12508,7 +12503,7 @@
       </dsp:nvSpPr>
       <dsp:spPr>
         <a:xfrm rot="21426436">
-          <a:off x="2965035" y="1001130"/>
+          <a:off x="2897059" y="1001130"/>
           <a:ext cx="625955" cy="12139"/>
         </a:xfrm>
         <a:custGeom>
@@ -12578,7 +12573,7 @@
         </a:p>
       </dsp:txBody>
       <dsp:txXfrm>
-        <a:off x="3262364" y="991551"/>
+        <a:off x="3194388" y="991551"/>
         <a:ext cx="31297" cy="31297"/>
       </dsp:txXfrm>
     </dsp:sp>
@@ -12589,8 +12584,8 @@
       </dsp:nvSpPr>
       <dsp:spPr>
         <a:xfrm>
-          <a:off x="3590592" y="765151"/>
-          <a:ext cx="1100563" cy="452508"/>
+          <a:off x="3522616" y="765151"/>
+          <a:ext cx="1650731" cy="452508"/>
         </a:xfrm>
         <a:prstGeom prst="roundRect">
           <a:avLst>
@@ -12599,8 +12594,7 @@
         </a:prstGeom>
         <a:solidFill>
           <a:schemeClr val="accent1">
-            <a:lumMod val="40000"/>
-            <a:lumOff val="60000"/>
+            <a:lumMod val="75000"/>
           </a:schemeClr>
         </a:solidFill>
         <a:ln w="12700" cap="flat" cmpd="sng" algn="ctr">
@@ -12656,8 +12650,8 @@
         </a:p>
       </dsp:txBody>
       <dsp:txXfrm>
-        <a:off x="3603846" y="778405"/>
-        <a:ext cx="1074055" cy="426000"/>
+        <a:off x="3535870" y="778405"/>
+        <a:ext cx="1624223" cy="426000"/>
       </dsp:txXfrm>
     </dsp:sp>
     <dsp:sp modelId="{A1995BEA-879F-45AC-A2DB-A9A4CBA00D16}">
@@ -12667,7 +12661,7 @@
       </dsp:nvSpPr>
       <dsp:spPr>
         <a:xfrm rot="2281255">
-          <a:off x="2881231" y="1261323"/>
+          <a:off x="2813255" y="1261323"/>
           <a:ext cx="793563" cy="12139"/>
         </a:xfrm>
         <a:custGeom>
@@ -12737,7 +12731,7 @@
         </a:p>
       </dsp:txBody>
       <dsp:txXfrm>
-        <a:off x="3258174" y="1247553"/>
+        <a:off x="3190198" y="1247553"/>
         <a:ext cx="39678" cy="39678"/>
       </dsp:txXfrm>
     </dsp:sp>
@@ -12748,8 +12742,8 @@
       </dsp:nvSpPr>
       <dsp:spPr>
         <a:xfrm>
-          <a:off x="3590592" y="1285535"/>
-          <a:ext cx="1081811" cy="452508"/>
+          <a:off x="3522616" y="1285535"/>
+          <a:ext cx="1648487" cy="452508"/>
         </a:xfrm>
         <a:prstGeom prst="roundRect">
           <a:avLst>
@@ -12758,8 +12752,7 @@
         </a:prstGeom>
         <a:solidFill>
           <a:schemeClr val="accent1">
-            <a:lumMod val="40000"/>
-            <a:lumOff val="60000"/>
+            <a:lumMod val="75000"/>
           </a:schemeClr>
         </a:solidFill>
         <a:ln w="12700" cap="flat" cmpd="sng" algn="ctr">
@@ -12815,8 +12808,8 @@
         </a:p>
       </dsp:txBody>
       <dsp:txXfrm>
-        <a:off x="3603846" y="1298789"/>
-        <a:ext cx="1055303" cy="426000"/>
+        <a:off x="3535870" y="1298789"/>
+        <a:ext cx="1621979" cy="426000"/>
       </dsp:txXfrm>
     </dsp:sp>
     <dsp:sp modelId="{C0975CBC-669A-4205-A63A-1F8CF2D146F0}">
@@ -12826,7 +12819,7 @@
       </dsp:nvSpPr>
       <dsp:spPr>
         <a:xfrm rot="3493377">
-          <a:off x="2684450" y="1521515"/>
+          <a:off x="2616475" y="1521515"/>
           <a:ext cx="1187124" cy="12139"/>
         </a:xfrm>
         <a:custGeom>
@@ -12896,7 +12889,7 @@
         </a:p>
       </dsp:txBody>
       <dsp:txXfrm>
-        <a:off x="3248335" y="1497906"/>
+        <a:off x="3180359" y="1497906"/>
         <a:ext cx="59356" cy="59356"/>
       </dsp:txXfrm>
     </dsp:sp>
@@ -12907,8 +12900,8 @@
       </dsp:nvSpPr>
       <dsp:spPr>
         <a:xfrm>
-          <a:off x="3590592" y="1805920"/>
-          <a:ext cx="1100563" cy="452508"/>
+          <a:off x="3522616" y="1805920"/>
+          <a:ext cx="1624975" cy="452508"/>
         </a:xfrm>
         <a:prstGeom prst="roundRect">
           <a:avLst>
@@ -12917,8 +12910,7 @@
         </a:prstGeom>
         <a:solidFill>
           <a:schemeClr val="accent1">
-            <a:lumMod val="40000"/>
-            <a:lumOff val="60000"/>
+            <a:lumMod val="75000"/>
           </a:schemeClr>
         </a:solidFill>
         <a:ln w="12700" cap="flat" cmpd="sng" algn="ctr">
@@ -12974,8 +12966,8 @@
         </a:p>
       </dsp:txBody>
       <dsp:txXfrm>
-        <a:off x="3603846" y="1819174"/>
-        <a:ext cx="1074055" cy="426000"/>
+        <a:off x="3535870" y="1819174"/>
+        <a:ext cx="1598467" cy="426000"/>
       </dsp:txXfrm>
     </dsp:sp>
     <dsp:sp modelId="{5F09A79E-9520-433E-BB57-E523B94B98E3}">
@@ -12985,7 +12977,7 @@
       </dsp:nvSpPr>
       <dsp:spPr>
         <a:xfrm rot="21047726">
-          <a:off x="1749941" y="2945615"/>
+          <a:off x="1681966" y="2945615"/>
           <a:ext cx="3139042" cy="12139"/>
         </a:xfrm>
         <a:custGeom>
@@ -13055,7 +13047,7 @@
         </a:p>
       </dsp:txBody>
       <dsp:txXfrm>
-        <a:off x="3240986" y="2873208"/>
+        <a:off x="3173011" y="2873208"/>
         <a:ext cx="156952" cy="156952"/>
       </dsp:txXfrm>
     </dsp:sp>
@@ -13066,7 +13058,7 @@
       </dsp:nvSpPr>
       <dsp:spPr>
         <a:xfrm>
-          <a:off x="4868774" y="2474370"/>
+          <a:off x="4800798" y="2474370"/>
           <a:ext cx="905016" cy="452508"/>
         </a:xfrm>
         <a:prstGeom prst="roundRect">
@@ -13132,7 +13124,7 @@
         </a:p>
       </dsp:txBody>
       <dsp:txXfrm>
-        <a:off x="4882028" y="2487624"/>
+        <a:off x="4814052" y="2487624"/>
         <a:ext cx="878508" cy="426000"/>
       </dsp:txXfrm>
     </dsp:sp>
@@ -13142,9 +13134,9 @@
         <dsp:cNvSpPr/>
       </dsp:nvSpPr>
       <dsp:spPr>
-        <a:xfrm rot="1036153">
-          <a:off x="5719478" y="3052212"/>
-          <a:ext cx="2409591" cy="12139"/>
+        <a:xfrm rot="894061">
+          <a:off x="5665779" y="3000696"/>
+          <a:ext cx="2381038" cy="12139"/>
         </a:xfrm>
         <a:custGeom>
           <a:avLst/>
@@ -13158,7 +13150,7 @@
                 <a:pt x="0" y="6069"/>
               </a:moveTo>
               <a:lnTo>
-                <a:pt x="2409591" y="6069"/>
+                <a:pt x="2381038" y="6069"/>
               </a:lnTo>
             </a:path>
           </a:pathLst>
@@ -13213,8 +13205,8 @@
         </a:p>
       </dsp:txBody>
       <dsp:txXfrm>
-        <a:off x="6864034" y="2998042"/>
-        <a:ext cx="120479" cy="120479"/>
+        <a:off x="6796772" y="2947240"/>
+        <a:ext cx="119051" cy="119051"/>
       </dsp:txXfrm>
     </dsp:sp>
     <dsp:sp modelId="{AEBF0B01-F414-4EC4-9E22-C0FA18A9F0EB}">
@@ -13224,8 +13216,8 @@
       </dsp:nvSpPr>
       <dsp:spPr>
         <a:xfrm>
-          <a:off x="8074758" y="3189685"/>
-          <a:ext cx="1093323" cy="452508"/>
+          <a:off x="8006782" y="3086654"/>
+          <a:ext cx="2175143" cy="452508"/>
         </a:xfrm>
         <a:prstGeom prst="roundRect">
           <a:avLst>
@@ -13293,8 +13285,8 @@
         </a:p>
       </dsp:txBody>
       <dsp:txXfrm>
-        <a:off x="8088012" y="3202939"/>
-        <a:ext cx="1066815" cy="426000"/>
+        <a:off x="8020036" y="3099908"/>
+        <a:ext cx="2148635" cy="426000"/>
       </dsp:txXfrm>
     </dsp:sp>
     <dsp:sp modelId="{0329808C-8689-4AEF-8103-7823A759FBC6}">
@@ -13304,7 +13296,7 @@
       </dsp:nvSpPr>
       <dsp:spPr>
         <a:xfrm rot="19823793">
-          <a:off x="5604779" y="2054950"/>
+          <a:off x="5536803" y="2054950"/>
           <a:ext cx="2589522" cy="12139"/>
         </a:xfrm>
         <a:custGeom>
@@ -13374,7 +13366,7 @@
         </a:p>
       </dsp:txBody>
       <dsp:txXfrm>
-        <a:off x="6834802" y="1996281"/>
+        <a:off x="6766826" y="1996281"/>
         <a:ext cx="129476" cy="129476"/>
       </dsp:txXfrm>
     </dsp:sp>
@@ -13385,8 +13377,8 @@
       </dsp:nvSpPr>
       <dsp:spPr>
         <a:xfrm>
-          <a:off x="8025290" y="1195161"/>
-          <a:ext cx="1113912" cy="452508"/>
+          <a:off x="7957314" y="1195161"/>
+          <a:ext cx="2136644" cy="452508"/>
         </a:xfrm>
         <a:prstGeom prst="roundRect">
           <a:avLst>
@@ -13454,8 +13446,8 @@
         </a:p>
       </dsp:txBody>
       <dsp:txXfrm>
-        <a:off x="8038544" y="1208415"/>
-        <a:ext cx="1087404" cy="426000"/>
+        <a:off x="7970568" y="1208415"/>
+        <a:ext cx="2110136" cy="426000"/>
       </dsp:txXfrm>
     </dsp:sp>
     <dsp:sp modelId="{BEE44F3C-FB85-444A-A416-5D795EA2B440}">
@@ -13464,9 +13456,9 @@
         <dsp:cNvSpPr/>
       </dsp:nvSpPr>
       <dsp:spPr>
-        <a:xfrm rot="1701429">
-          <a:off x="5613483" y="3329079"/>
-          <a:ext cx="2671874" cy="12139"/>
+        <a:xfrm rot="1597722">
+          <a:off x="5566319" y="3284003"/>
+          <a:ext cx="2630251" cy="12139"/>
         </a:xfrm>
         <a:custGeom>
           <a:avLst/>
@@ -13480,7 +13472,7 @@
                 <a:pt x="0" y="6069"/>
               </a:moveTo>
               <a:lnTo>
-                <a:pt x="2671874" y="6069"/>
+                <a:pt x="2630251" y="6069"/>
               </a:lnTo>
             </a:path>
           </a:pathLst>
@@ -13535,8 +13527,8 @@
         </a:p>
       </dsp:txBody>
       <dsp:txXfrm>
-        <a:off x="6882623" y="3268352"/>
-        <a:ext cx="133593" cy="133593"/>
+        <a:off x="6815688" y="3224316"/>
+        <a:ext cx="131512" cy="131512"/>
       </dsp:txXfrm>
     </dsp:sp>
     <dsp:sp modelId="{42E15086-1FE8-4CB6-85EB-06567F912868}">
@@ -13546,8 +13538,8 @@
       </dsp:nvSpPr>
       <dsp:spPr>
         <a:xfrm>
-          <a:off x="8125050" y="3743420"/>
-          <a:ext cx="1028080" cy="452508"/>
+          <a:off x="8057074" y="3653267"/>
+          <a:ext cx="2109910" cy="452508"/>
         </a:xfrm>
         <a:prstGeom prst="roundRect">
           <a:avLst>
@@ -13615,8 +13607,8 @@
         </a:p>
       </dsp:txBody>
       <dsp:txXfrm>
-        <a:off x="8138304" y="3756674"/>
-        <a:ext cx="1001572" cy="426000"/>
+        <a:off x="8070328" y="3666521"/>
+        <a:ext cx="2083402" cy="426000"/>
       </dsp:txXfrm>
     </dsp:sp>
     <dsp:sp modelId="{24713073-BE5A-4959-ABA1-02777A0912FF}">
@@ -13625,9 +13617,9 @@
         <dsp:cNvSpPr/>
       </dsp:nvSpPr>
       <dsp:spPr>
-        <a:xfrm rot="20482832">
-          <a:off x="5708011" y="2293290"/>
-          <a:ext cx="2513544" cy="12139"/>
+        <a:xfrm rot="20371706">
+          <a:off x="5629869" y="2273973"/>
+          <a:ext cx="2405092" cy="12139"/>
         </a:xfrm>
         <a:custGeom>
           <a:avLst/>
@@ -13641,7 +13633,7 @@
                 <a:pt x="0" y="6069"/>
               </a:moveTo>
               <a:lnTo>
-                <a:pt x="2513544" y="6069"/>
+                <a:pt x="2405092" y="6069"/>
               </a:lnTo>
             </a:path>
           </a:pathLst>
@@ -13696,8 +13688,8 @@
         </a:p>
       </dsp:txBody>
       <dsp:txXfrm>
-        <a:off x="6901944" y="2236521"/>
-        <a:ext cx="125677" cy="125677"/>
+        <a:off x="6772288" y="2219915"/>
+        <a:ext cx="120254" cy="120254"/>
       </dsp:txXfrm>
     </dsp:sp>
     <dsp:sp modelId="{9DBE29E2-9F63-4A60-97C4-802CE647A739}">
@@ -13707,8 +13699,8 @@
       </dsp:nvSpPr>
       <dsp:spPr>
         <a:xfrm>
-          <a:off x="8155775" y="1671842"/>
-          <a:ext cx="905016" cy="452508"/>
+          <a:off x="7959016" y="1633207"/>
+          <a:ext cx="2162391" cy="452508"/>
         </a:xfrm>
         <a:prstGeom prst="roundRect">
           <a:avLst>
@@ -13781,8 +13773,8 @@
         </a:p>
       </dsp:txBody>
       <dsp:txXfrm>
-        <a:off x="8169029" y="1685096"/>
-        <a:ext cx="878508" cy="426000"/>
+        <a:off x="7972270" y="1646461"/>
+        <a:ext cx="2135883" cy="426000"/>
       </dsp:txXfrm>
     </dsp:sp>
     <dsp:sp modelId="{9FE259C2-1891-4DDD-B113-F516A04A81AB}">
@@ -13791,9 +13783,9 @@
         <dsp:cNvSpPr/>
       </dsp:nvSpPr>
       <dsp:spPr>
-        <a:xfrm rot="21098008">
-          <a:off x="5760990" y="2519544"/>
-          <a:ext cx="2405549" cy="12139"/>
+        <a:xfrm rot="21072699">
+          <a:off x="5692366" y="2519544"/>
+          <a:ext cx="2290931" cy="12139"/>
         </a:xfrm>
         <a:custGeom>
           <a:avLst/>
@@ -13807,7 +13799,7 @@
                 <a:pt x="0" y="6069"/>
               </a:moveTo>
               <a:lnTo>
-                <a:pt x="2405549" y="6069"/>
+                <a:pt x="2290931" y="6069"/>
               </a:lnTo>
             </a:path>
           </a:pathLst>
@@ -13862,8 +13854,8 @@
         </a:p>
       </dsp:txBody>
       <dsp:txXfrm>
-        <a:off x="6903626" y="2465475"/>
-        <a:ext cx="120277" cy="120277"/>
+        <a:off x="6780558" y="2468341"/>
+        <a:ext cx="114546" cy="114546"/>
       </dsp:txXfrm>
     </dsp:sp>
     <dsp:sp modelId="{5D0532A0-3F1F-42AE-AA11-6D0F5E213FFA}">
@@ -13873,8 +13865,8 @@
       </dsp:nvSpPr>
       <dsp:spPr>
         <a:xfrm>
-          <a:off x="8153739" y="2124350"/>
-          <a:ext cx="905016" cy="452508"/>
+          <a:off x="7969849" y="2124350"/>
+          <a:ext cx="2179985" cy="452508"/>
         </a:xfrm>
         <a:prstGeom prst="roundRect">
           <a:avLst>
@@ -13942,8 +13934,8 @@
         </a:p>
       </dsp:txBody>
       <dsp:txXfrm>
-        <a:off x="8166993" y="2137604"/>
-        <a:ext cx="878508" cy="426000"/>
+        <a:off x="7983103" y="2137604"/>
+        <a:ext cx="2153477" cy="426000"/>
       </dsp:txXfrm>
     </dsp:sp>
     <dsp:sp modelId="{521EAAF5-A044-4954-BAC2-C0BCCF5C23F6}">
@@ -13952,9 +13944,9 @@
         <dsp:cNvSpPr/>
       </dsp:nvSpPr>
       <dsp:spPr>
-        <a:xfrm rot="177343">
-          <a:off x="5772205" y="2755996"/>
-          <a:ext cx="2383119" cy="12139"/>
+        <a:xfrm rot="187468">
+          <a:off x="5704139" y="2755996"/>
+          <a:ext cx="2254516" cy="12139"/>
         </a:xfrm>
         <a:custGeom>
           <a:avLst/>
@@ -13968,7 +13960,7 @@
                 <a:pt x="0" y="6069"/>
               </a:moveTo>
               <a:lnTo>
-                <a:pt x="2383119" y="6069"/>
+                <a:pt x="2254516" y="6069"/>
               </a:lnTo>
             </a:path>
           </a:pathLst>
@@ -14023,8 +14015,8 @@
         </a:p>
       </dsp:txBody>
       <dsp:txXfrm>
-        <a:off x="6904187" y="2702487"/>
-        <a:ext cx="119155" cy="119155"/>
+        <a:off x="6775034" y="2705702"/>
+        <a:ext cx="112725" cy="112725"/>
       </dsp:txXfrm>
     </dsp:sp>
     <dsp:sp modelId="{57B835F5-38A4-4C12-B76A-9FFFFA745CFB}">
@@ -14034,8 +14026,8 @@
       </dsp:nvSpPr>
       <dsp:spPr>
         <a:xfrm>
-          <a:off x="8153739" y="2597253"/>
-          <a:ext cx="905016" cy="452508"/>
+          <a:off x="7956979" y="2597253"/>
+          <a:ext cx="2195144" cy="452508"/>
         </a:xfrm>
         <a:prstGeom prst="roundRect">
           <a:avLst>
@@ -14103,8 +14095,8 @@
         </a:p>
       </dsp:txBody>
       <dsp:txXfrm>
-        <a:off x="8166993" y="2610507"/>
-        <a:ext cx="878508" cy="426000"/>
+        <a:off x="7970233" y="2610507"/>
+        <a:ext cx="2168636" cy="426000"/>
       </dsp:txXfrm>
     </dsp:sp>
     <dsp:sp modelId="{A2567869-FAE6-4FB5-9B5D-86CB22F50032}">
@@ -14114,7 +14106,7 @@
       </dsp:nvSpPr>
       <dsp:spPr>
         <a:xfrm rot="246344">
-          <a:off x="1766096" y="3309802"/>
+          <a:off x="1698121" y="3309802"/>
           <a:ext cx="3160092" cy="12139"/>
         </a:xfrm>
         <a:custGeom>
@@ -14184,7 +14176,7 @@
         </a:p>
       </dsp:txBody>
       <dsp:txXfrm>
-        <a:off x="3267140" y="3236870"/>
+        <a:off x="3199164" y="3236870"/>
         <a:ext cx="158004" cy="158004"/>
       </dsp:txXfrm>
     </dsp:sp>
@@ -14195,7 +14187,7 @@
       </dsp:nvSpPr>
       <dsp:spPr>
         <a:xfrm>
-          <a:off x="4922133" y="3202745"/>
+          <a:off x="4854158" y="3202745"/>
           <a:ext cx="905016" cy="452508"/>
         </a:xfrm>
         <a:prstGeom prst="roundRect">
@@ -14263,7 +14255,7 @@
         </a:p>
       </dsp:txBody>
       <dsp:txXfrm>
-        <a:off x="4935387" y="3215999"/>
+        <a:off x="4867412" y="3215999"/>
         <a:ext cx="878508" cy="426000"/>
       </dsp:txXfrm>
     </dsp:sp>
@@ -14274,7 +14266,7 @@
       </dsp:nvSpPr>
       <dsp:spPr>
         <a:xfrm rot="4934225">
-          <a:off x="977986" y="4104158"/>
+          <a:off x="910011" y="4104158"/>
           <a:ext cx="1831752" cy="12139"/>
         </a:xfrm>
         <a:custGeom>
@@ -14344,7 +14336,7 @@
         </a:p>
       </dsp:txBody>
       <dsp:txXfrm>
-        <a:off x="1848069" y="4064434"/>
+        <a:off x="1780093" y="4064434"/>
         <a:ext cx="91587" cy="91587"/>
       </dsp:txXfrm>
     </dsp:sp>
@@ -14355,7 +14347,7 @@
       </dsp:nvSpPr>
       <dsp:spPr>
         <a:xfrm>
-          <a:off x="2017574" y="4791456"/>
+          <a:off x="1949598" y="4791456"/>
           <a:ext cx="905016" cy="452508"/>
         </a:xfrm>
         <a:prstGeom prst="roundRect">
@@ -14422,7 +14414,7 @@
         </a:p>
       </dsp:txBody>
       <dsp:txXfrm>
-        <a:off x="2030828" y="4804710"/>
+        <a:off x="1962852" y="4804710"/>
         <a:ext cx="878508" cy="426000"/>
       </dsp:txXfrm>
     </dsp:sp>
@@ -14433,7 +14425,7 @@
       </dsp:nvSpPr>
       <dsp:spPr>
         <a:xfrm rot="20723835">
-          <a:off x="2902202" y="4852516"/>
+          <a:off x="2834226" y="4852516"/>
           <a:ext cx="1262313" cy="12139"/>
         </a:xfrm>
         <a:custGeom>
@@ -14503,7 +14495,7 @@
         </a:p>
       </dsp:txBody>
       <dsp:txXfrm>
-        <a:off x="3501801" y="4827028"/>
+        <a:off x="3433825" y="4827028"/>
         <a:ext cx="63115" cy="63115"/>
       </dsp:txXfrm>
     </dsp:sp>
@@ -14514,7 +14506,7 @@
       </dsp:nvSpPr>
       <dsp:spPr>
         <a:xfrm>
-          <a:off x="4144127" y="4473207"/>
+          <a:off x="4076151" y="4473207"/>
           <a:ext cx="2059192" cy="452508"/>
         </a:xfrm>
         <a:prstGeom prst="roundRect">
@@ -14580,7 +14572,7 @@
         </a:p>
       </dsp:txBody>
       <dsp:txXfrm>
-        <a:off x="4157381" y="4486461"/>
+        <a:off x="4089405" y="4486461"/>
         <a:ext cx="2032684" cy="426000"/>
       </dsp:txXfrm>
     </dsp:sp>
@@ -14590,9 +14582,9 @@
         <dsp:cNvSpPr/>
       </dsp:nvSpPr>
       <dsp:spPr>
-        <a:xfrm rot="710251">
-          <a:off x="2908421" y="5148316"/>
-          <a:ext cx="1332530" cy="12139"/>
+        <a:xfrm rot="777296">
+          <a:off x="2839097" y="5148316"/>
+          <a:ext cx="1219313" cy="12139"/>
         </a:xfrm>
         <a:custGeom>
           <a:avLst/>
@@ -14606,7 +14598,7 @@
                 <a:pt x="0" y="6069"/>
               </a:moveTo>
               <a:lnTo>
-                <a:pt x="1332530" y="6069"/>
+                <a:pt x="1219313" y="6069"/>
               </a:lnTo>
             </a:path>
           </a:pathLst>
@@ -14661,8 +14653,8 @@
         </a:p>
       </dsp:txBody>
       <dsp:txXfrm>
-        <a:off x="3541373" y="5121072"/>
-        <a:ext cx="66626" cy="66626"/>
+        <a:off x="3418270" y="5123903"/>
+        <a:ext cx="60965" cy="60965"/>
       </dsp:txXfrm>
     </dsp:sp>
     <dsp:sp modelId="{6FEA8E1F-3F0F-416E-B514-7EF49B3F6CAA}">
@@ -14672,8 +14664,8 @@
       </dsp:nvSpPr>
       <dsp:spPr>
         <a:xfrm>
-          <a:off x="4226782" y="5064807"/>
-          <a:ext cx="1976546" cy="452508"/>
+          <a:off x="4042892" y="5064807"/>
+          <a:ext cx="2068849" cy="452508"/>
         </a:xfrm>
         <a:prstGeom prst="roundRect">
           <a:avLst>
@@ -14738,8 +14730,8 @@
         </a:p>
       </dsp:txBody>
       <dsp:txXfrm>
-        <a:off x="4240036" y="5078061"/>
-        <a:ext cx="1950038" cy="426000"/>
+        <a:off x="4056146" y="5078061"/>
+        <a:ext cx="2042341" cy="426000"/>
       </dsp:txXfrm>
     </dsp:sp>
     <dsp:sp modelId="{4A9F63E5-B50C-42B1-B8AA-B7F8055EA37F}">
@@ -14748,9 +14740,9 @@
         <dsp:cNvSpPr/>
       </dsp:nvSpPr>
       <dsp:spPr>
-        <a:xfrm rot="1786738">
-          <a:off x="2807945" y="5442827"/>
-          <a:ext cx="1736359" cy="12139"/>
+        <a:xfrm rot="2093435">
+          <a:off x="2719114" y="5442827"/>
+          <a:ext cx="1507614" cy="12139"/>
         </a:xfrm>
         <a:custGeom>
           <a:avLst/>
@@ -14764,7 +14756,7 @@
                 <a:pt x="0" y="6069"/>
               </a:moveTo>
               <a:lnTo>
-                <a:pt x="1736359" y="6069"/>
+                <a:pt x="1507614" y="6069"/>
               </a:lnTo>
             </a:path>
           </a:pathLst>
@@ -14819,8 +14811,8 @@
         </a:p>
       </dsp:txBody>
       <dsp:txXfrm>
-        <a:off x="3632716" y="5405487"/>
-        <a:ext cx="86817" cy="86817"/>
+        <a:off x="3435231" y="5411206"/>
+        <a:ext cx="75380" cy="75380"/>
       </dsp:txXfrm>
     </dsp:sp>
     <dsp:sp modelId="{BEB48FE5-A300-4862-9406-3D8FE9CE9666}">
@@ -14830,8 +14822,8 @@
       </dsp:nvSpPr>
       <dsp:spPr>
         <a:xfrm>
-          <a:off x="4429660" y="5653828"/>
-          <a:ext cx="1563922" cy="452508"/>
+          <a:off x="4091229" y="5653828"/>
+          <a:ext cx="2061663" cy="452508"/>
         </a:xfrm>
         <a:prstGeom prst="roundRect">
           <a:avLst>
@@ -14896,8 +14888,8 @@
         </a:p>
       </dsp:txBody>
       <dsp:txXfrm>
-        <a:off x="4442914" y="5667082"/>
-        <a:ext cx="1537414" cy="426000"/>
+        <a:off x="4104483" y="5667082"/>
+        <a:ext cx="2035155" cy="426000"/>
       </dsp:txXfrm>
     </dsp:sp>
   </dsp:spTree>
@@ -19113,7 +19105,7 @@
           <a:p>
             <a:fld id="{ED9AE19F-43DB-4FA6-89A4-8F4E88EC7C80}" type="datetimeFigureOut">
               <a:rPr lang="en-US" smtClean="0"/>
-              <a:t>8/11/2021</a:t>
+              <a:t>8/14/2021</a:t>
             </a:fld>
             <a:endParaRPr lang="en-US"/>
           </a:p>
@@ -19311,7 +19303,7 @@
           <a:p>
             <a:fld id="{ED9AE19F-43DB-4FA6-89A4-8F4E88EC7C80}" type="datetimeFigureOut">
               <a:rPr lang="en-US" smtClean="0"/>
-              <a:t>8/11/2021</a:t>
+              <a:t>8/14/2021</a:t>
             </a:fld>
             <a:endParaRPr lang="en-US"/>
           </a:p>
@@ -19519,7 +19511,7 @@
           <a:p>
             <a:fld id="{ED9AE19F-43DB-4FA6-89A4-8F4E88EC7C80}" type="datetimeFigureOut">
               <a:rPr lang="en-US" smtClean="0"/>
-              <a:t>8/11/2021</a:t>
+              <a:t>8/14/2021</a:t>
             </a:fld>
             <a:endParaRPr lang="en-US"/>
           </a:p>
@@ -19717,7 +19709,7 @@
           <a:p>
             <a:fld id="{ED9AE19F-43DB-4FA6-89A4-8F4E88EC7C80}" type="datetimeFigureOut">
               <a:rPr lang="en-US" smtClean="0"/>
-              <a:t>8/11/2021</a:t>
+              <a:t>8/14/2021</a:t>
             </a:fld>
             <a:endParaRPr lang="en-US"/>
           </a:p>
@@ -19992,7 +19984,7 @@
           <a:p>
             <a:fld id="{ED9AE19F-43DB-4FA6-89A4-8F4E88EC7C80}" type="datetimeFigureOut">
               <a:rPr lang="en-US" smtClean="0"/>
-              <a:t>8/11/2021</a:t>
+              <a:t>8/14/2021</a:t>
             </a:fld>
             <a:endParaRPr lang="en-US"/>
           </a:p>
@@ -20257,7 +20249,7 @@
           <a:p>
             <a:fld id="{ED9AE19F-43DB-4FA6-89A4-8F4E88EC7C80}" type="datetimeFigureOut">
               <a:rPr lang="en-US" smtClean="0"/>
-              <a:t>8/11/2021</a:t>
+              <a:t>8/14/2021</a:t>
             </a:fld>
             <a:endParaRPr lang="en-US"/>
           </a:p>
@@ -20669,7 +20661,7 @@
           <a:p>
             <a:fld id="{ED9AE19F-43DB-4FA6-89A4-8F4E88EC7C80}" type="datetimeFigureOut">
               <a:rPr lang="en-US" smtClean="0"/>
-              <a:t>8/11/2021</a:t>
+              <a:t>8/14/2021</a:t>
             </a:fld>
             <a:endParaRPr lang="en-US"/>
           </a:p>
@@ -20810,7 +20802,7 @@
           <a:p>
             <a:fld id="{ED9AE19F-43DB-4FA6-89A4-8F4E88EC7C80}" type="datetimeFigureOut">
               <a:rPr lang="en-US" smtClean="0"/>
-              <a:t>8/11/2021</a:t>
+              <a:t>8/14/2021</a:t>
             </a:fld>
             <a:endParaRPr lang="en-US"/>
           </a:p>
@@ -20923,7 +20915,7 @@
           <a:p>
             <a:fld id="{ED9AE19F-43DB-4FA6-89A4-8F4E88EC7C80}" type="datetimeFigureOut">
               <a:rPr lang="en-US" smtClean="0"/>
-              <a:t>8/11/2021</a:t>
+              <a:t>8/14/2021</a:t>
             </a:fld>
             <a:endParaRPr lang="en-US"/>
           </a:p>
@@ -21234,7 +21226,7 @@
           <a:p>
             <a:fld id="{ED9AE19F-43DB-4FA6-89A4-8F4E88EC7C80}" type="datetimeFigureOut">
               <a:rPr lang="en-US" smtClean="0"/>
-              <a:t>8/11/2021</a:t>
+              <a:t>8/14/2021</a:t>
             </a:fld>
             <a:endParaRPr lang="en-US"/>
           </a:p>
@@ -21522,7 +21514,7 @@
           <a:p>
             <a:fld id="{ED9AE19F-43DB-4FA6-89A4-8F4E88EC7C80}" type="datetimeFigureOut">
               <a:rPr lang="en-US" smtClean="0"/>
-              <a:t>8/11/2021</a:t>
+              <a:t>8/14/2021</a:t>
             </a:fld>
             <a:endParaRPr lang="en-US"/>
           </a:p>
@@ -21763,7 +21755,7 @@
           <a:p>
             <a:fld id="{ED9AE19F-43DB-4FA6-89A4-8F4E88EC7C80}" type="datetimeFigureOut">
               <a:rPr lang="en-US" smtClean="0"/>
-              <a:t>8/11/2021</a:t>
+              <a:t>8/14/2021</a:t>
             </a:fld>
             <a:endParaRPr lang="en-US"/>
           </a:p>
@@ -25267,14 +25259,14 @@
           <p:nvPr>
             <p:extLst>
               <p:ext uri="{D42A27DB-BD31-4B8C-83A1-F6EECF244321}">
-                <p14:modId xmlns:p14="http://schemas.microsoft.com/office/powerpoint/2010/main" val="3865138324"/>
+                <p14:modId xmlns:p14="http://schemas.microsoft.com/office/powerpoint/2010/main" val="2440603076"/>
               </p:ext>
             </p:extLst>
           </p:nvPr>
         </p:nvGraphicFramePr>
         <p:xfrm>
           <a:off x="1444514" y="3638319"/>
-          <a:ext cx="8617095" cy="1478280"/>
+          <a:ext cx="8617094" cy="1752600"/>
         </p:xfrm>
         <a:graphic>
           <a:graphicData uri="http://schemas.openxmlformats.org/drawingml/2006/table">
@@ -25283,42 +25275,49 @@
                 <a:tableStyleId>{00A15C55-8517-42AA-B614-E9B94910E393}</a:tableStyleId>
               </a:tblPr>
               <a:tblGrid>
-                <a:gridCol w="1512214">
+                <a:gridCol w="1286454">
+                  <a:extLst>
+                    <a:ext uri="{9D8B030D-6E8A-4147-A177-3AD203B41FA5}">
+                      <a16:colId xmlns:a16="http://schemas.microsoft.com/office/drawing/2014/main" val="145477168"/>
+                    </a:ext>
+                  </a:extLst>
+                </a:gridCol>
+                <a:gridCol w="1286454">
                   <a:extLst>
                     <a:ext uri="{9D8B030D-6E8A-4147-A177-3AD203B41FA5}">
                       <a16:colId xmlns:a16="http://schemas.microsoft.com/office/drawing/2014/main" val="1135019443"/>
                     </a:ext>
                   </a:extLst>
                 </a:gridCol>
-                <a:gridCol w="1644238">
+                <a:gridCol w="1398768">
                   <a:extLst>
                     <a:ext uri="{9D8B030D-6E8A-4147-A177-3AD203B41FA5}">
                       <a16:colId xmlns:a16="http://schemas.microsoft.com/office/drawing/2014/main" val="109007189"/>
                     </a:ext>
                   </a:extLst>
                 </a:gridCol>
-                <a:gridCol w="1378040">
+                <a:gridCol w="1172311">
                   <a:extLst>
                     <a:ext uri="{9D8B030D-6E8A-4147-A177-3AD203B41FA5}">
                       <a16:colId xmlns:a16="http://schemas.microsoft.com/office/drawing/2014/main" val="1334342954"/>
                     </a:ext>
                   </a:extLst>
                 </a:gridCol>
-                <a:gridCol w="1545464">
+                <a:gridCol w="1314740">
                   <a:extLst>
                     <a:ext uri="{9D8B030D-6E8A-4147-A177-3AD203B41FA5}">
                       <a16:colId xmlns:a16="http://schemas.microsoft.com/office/drawing/2014/main" val="2375800834"/>
                     </a:ext>
                   </a:extLst>
                 </a:gridCol>
-                <a:gridCol w="1068947">
+                <a:gridCol w="909363">
                   <a:extLst>
                     <a:ext uri="{9D8B030D-6E8A-4147-A177-3AD203B41FA5}">
                       <a16:colId xmlns:a16="http://schemas.microsoft.com/office/drawing/2014/main" val="358340357"/>
                     </a:ext>
                   </a:extLst>
                 </a:gridCol>
-                <a:gridCol w="1468192">
+                <a:gridCol w="1249004">
                   <a:extLst>
                     <a:ext uri="{9D8B030D-6E8A-4147-A177-3AD203B41FA5}">
                       <a16:colId xmlns:a16="http://schemas.microsoft.com/office/drawing/2014/main" val="822705198"/>
@@ -25327,6 +25326,35 @@
                 </a:gridCol>
               </a:tblGrid>
               <a:tr h="0">
+                <a:tc>
+                  <a:txBody>
+                    <a:bodyPr/>
+                    <a:lstStyle/>
+                    <a:p>
+                      <a:pPr algn="ctr"/>
+                      <a:r>
+                        <a:rPr lang="fa-IR" dirty="0">
+                          <a:solidFill>
+                            <a:schemeClr val="bg2">
+                              <a:lumMod val="10000"/>
+                            </a:schemeClr>
+                          </a:solidFill>
+                          <a:cs typeface="B Nazanin" panose="00000400000000000000" pitchFamily="2" charset="-78"/>
+                        </a:rPr>
+                        <a:t>ویرایش/حذف</a:t>
+                      </a:r>
+                      <a:endParaRPr lang="en-US" dirty="0">
+                        <a:solidFill>
+                          <a:schemeClr val="bg2">
+                            <a:lumMod val="10000"/>
+                          </a:schemeClr>
+                        </a:solidFill>
+                        <a:cs typeface="B Nazanin" panose="00000400000000000000" pitchFamily="2" charset="-78"/>
+                      </a:endParaRPr>
+                    </a:p>
+                  </a:txBody>
+                  <a:tcPr/>
+                </a:tc>
                 <a:tc>
                   <a:txBody>
                     <a:bodyPr/>
@@ -25514,6 +25542,19 @@
                     <a:lstStyle/>
                     <a:p>
                       <a:pPr algn="ctr"/>
+                      <a:endParaRPr lang="en-US" dirty="0">
+                        <a:cs typeface="B Nazanin" panose="00000400000000000000" pitchFamily="2" charset="-78"/>
+                      </a:endParaRPr>
+                    </a:p>
+                  </a:txBody>
+                  <a:tcPr/>
+                </a:tc>
+                <a:tc>
+                  <a:txBody>
+                    <a:bodyPr/>
+                    <a:lstStyle/>
+                    <a:p>
+                      <a:pPr algn="ctr"/>
                       <a:r>
                         <a:rPr lang="fa-IR" dirty="0">
                           <a:cs typeface="B Nazanin" panose="00000400000000000000" pitchFamily="2" charset="-78"/>
@@ -25635,6 +25676,19 @@
                     <a:lstStyle/>
                     <a:p>
                       <a:pPr algn="ctr"/>
+                      <a:endParaRPr lang="en-US" dirty="0">
+                        <a:cs typeface="B Nazanin" panose="00000400000000000000" pitchFamily="2" charset="-78"/>
+                      </a:endParaRPr>
+                    </a:p>
+                  </a:txBody>
+                  <a:tcPr/>
+                </a:tc>
+                <a:tc>
+                  <a:txBody>
+                    <a:bodyPr/>
+                    <a:lstStyle/>
+                    <a:p>
+                      <a:pPr algn="ctr"/>
                       <a:r>
                         <a:rPr lang="fa-IR" dirty="0">
                           <a:cs typeface="B Nazanin" panose="00000400000000000000" pitchFamily="2" charset="-78"/>
@@ -25750,6 +25804,19 @@
                 </a:extLst>
               </a:tr>
               <a:tr h="370840">
+                <a:tc>
+                  <a:txBody>
+                    <a:bodyPr/>
+                    <a:lstStyle/>
+                    <a:p>
+                      <a:pPr algn="ctr"/>
+                      <a:endParaRPr lang="en-US" dirty="0">
+                        <a:cs typeface="B Nazanin" panose="00000400000000000000" pitchFamily="2" charset="-78"/>
+                      </a:endParaRPr>
+                    </a:p>
+                  </a:txBody>
+                  <a:tcPr/>
+                </a:tc>
                 <a:tc gridSpan="3">
                   <a:txBody>
                     <a:bodyPr/>
@@ -25890,6 +25957,282 @@
           </a:p>
         </p:txBody>
       </p:sp>
+      <p:sp>
+        <p:nvSpPr>
+          <p:cNvPr id="2" name="Rectangle: Rounded Corners 1">
+            <a:extLst>
+              <a:ext uri="{FF2B5EF4-FFF2-40B4-BE49-F238E27FC236}">
+                <a16:creationId xmlns:a16="http://schemas.microsoft.com/office/drawing/2014/main" id="{387F6A8C-B4EF-4053-A2D3-31DBB6DE4A90}"/>
+              </a:ext>
+            </a:extLst>
+          </p:cNvPr>
+          <p:cNvSpPr/>
+          <p:nvPr/>
+        </p:nvSpPr>
+        <p:spPr>
+          <a:xfrm>
+            <a:off x="1613016" y="4327301"/>
+            <a:ext cx="962759" cy="206062"/>
+          </a:xfrm>
+          <a:prstGeom prst="roundRect">
+            <a:avLst/>
+          </a:prstGeom>
+          <a:solidFill>
+            <a:schemeClr val="accent2"/>
+          </a:solidFill>
+        </p:spPr>
+        <p:style>
+          <a:lnRef idx="2">
+            <a:schemeClr val="accent1">
+              <a:shade val="50000"/>
+            </a:schemeClr>
+          </a:lnRef>
+          <a:fillRef idx="1">
+            <a:schemeClr val="accent1"/>
+          </a:fillRef>
+          <a:effectRef idx="0">
+            <a:schemeClr val="accent1"/>
+          </a:effectRef>
+          <a:fontRef idx="minor">
+            <a:schemeClr val="lt1"/>
+          </a:fontRef>
+        </p:style>
+        <p:txBody>
+          <a:bodyPr rtlCol="0" anchor="ctr"/>
+          <a:lstStyle/>
+          <a:p>
+            <a:r>
+              <a:rPr lang="fa-IR" dirty="0">
+                <a:cs typeface="B Nazanin" panose="00000400000000000000" pitchFamily="2" charset="-78"/>
+              </a:rPr>
+              <a:t>انتخاب</a:t>
+            </a:r>
+            <a:endParaRPr lang="en-US" dirty="0">
+              <a:cs typeface="B Nazanin" panose="00000400000000000000" pitchFamily="2" charset="-78"/>
+            </a:endParaRPr>
+          </a:p>
+        </p:txBody>
+      </p:sp>
+      <p:pic>
+        <p:nvPicPr>
+          <p:cNvPr id="22" name="Picture 21">
+            <a:extLst>
+              <a:ext uri="{FF2B5EF4-FFF2-40B4-BE49-F238E27FC236}">
+                <a16:creationId xmlns:a16="http://schemas.microsoft.com/office/drawing/2014/main" id="{7A7EE1BB-F047-4130-A20A-81F6ED46D4FB}"/>
+              </a:ext>
+            </a:extLst>
+          </p:cNvPr>
+          <p:cNvPicPr>
+            <a:picLocks noChangeAspect="1"/>
+          </p:cNvPicPr>
+          <p:nvPr/>
+        </p:nvPicPr>
+        <p:blipFill>
+          <a:blip r:embed="rId7">
+            <a:extLst>
+              <a:ext uri="{28A0092B-C50C-407E-A947-70E740481C1C}">
+                <a14:useLocalDpi xmlns:a14="http://schemas.microsoft.com/office/drawing/2010/main" val="0"/>
+              </a:ext>
+            </a:extLst>
+          </a:blip>
+          <a:stretch>
+            <a:fillRect/>
+          </a:stretch>
+        </p:blipFill>
+        <p:spPr>
+          <a:xfrm flipH="1">
+            <a:off x="2333151" y="4343899"/>
+            <a:ext cx="172865" cy="172865"/>
+          </a:xfrm>
+          <a:prstGeom prst="rect">
+            <a:avLst/>
+          </a:prstGeom>
+        </p:spPr>
+      </p:pic>
+      <p:sp>
+        <p:nvSpPr>
+          <p:cNvPr id="23" name="Rectangle: Rounded Corners 22">
+            <a:extLst>
+              <a:ext uri="{FF2B5EF4-FFF2-40B4-BE49-F238E27FC236}">
+                <a16:creationId xmlns:a16="http://schemas.microsoft.com/office/drawing/2014/main" id="{D5FD3DE7-A724-48A1-A206-873E223000E3}"/>
+              </a:ext>
+            </a:extLst>
+          </p:cNvPr>
+          <p:cNvSpPr/>
+          <p:nvPr/>
+        </p:nvSpPr>
+        <p:spPr>
+          <a:xfrm>
+            <a:off x="1613016" y="4671286"/>
+            <a:ext cx="962759" cy="206062"/>
+          </a:xfrm>
+          <a:prstGeom prst="roundRect">
+            <a:avLst/>
+          </a:prstGeom>
+          <a:solidFill>
+            <a:schemeClr val="accent2"/>
+          </a:solidFill>
+        </p:spPr>
+        <p:style>
+          <a:lnRef idx="2">
+            <a:schemeClr val="accent1">
+              <a:shade val="50000"/>
+            </a:schemeClr>
+          </a:lnRef>
+          <a:fillRef idx="1">
+            <a:schemeClr val="accent1"/>
+          </a:fillRef>
+          <a:effectRef idx="0">
+            <a:schemeClr val="accent1"/>
+          </a:effectRef>
+          <a:fontRef idx="minor">
+            <a:schemeClr val="lt1"/>
+          </a:fontRef>
+        </p:style>
+        <p:txBody>
+          <a:bodyPr rtlCol="0" anchor="ctr"/>
+          <a:lstStyle/>
+          <a:p>
+            <a:r>
+              <a:rPr lang="fa-IR" dirty="0">
+                <a:cs typeface="B Nazanin" panose="00000400000000000000" pitchFamily="2" charset="-78"/>
+              </a:rPr>
+              <a:t>انتخاب</a:t>
+            </a:r>
+            <a:endParaRPr lang="en-US" dirty="0">
+              <a:cs typeface="B Nazanin" panose="00000400000000000000" pitchFamily="2" charset="-78"/>
+            </a:endParaRPr>
+          </a:p>
+        </p:txBody>
+      </p:sp>
+      <p:pic>
+        <p:nvPicPr>
+          <p:cNvPr id="24" name="Picture 23">
+            <a:extLst>
+              <a:ext uri="{FF2B5EF4-FFF2-40B4-BE49-F238E27FC236}">
+                <a16:creationId xmlns:a16="http://schemas.microsoft.com/office/drawing/2014/main" id="{E580BADA-D76F-4273-9572-FDFBD287C44F}"/>
+              </a:ext>
+            </a:extLst>
+          </p:cNvPr>
+          <p:cNvPicPr>
+            <a:picLocks noChangeAspect="1"/>
+          </p:cNvPicPr>
+          <p:nvPr/>
+        </p:nvPicPr>
+        <p:blipFill>
+          <a:blip r:embed="rId7">
+            <a:extLst>
+              <a:ext uri="{28A0092B-C50C-407E-A947-70E740481C1C}">
+                <a14:useLocalDpi xmlns:a14="http://schemas.microsoft.com/office/drawing/2010/main" val="0"/>
+              </a:ext>
+            </a:extLst>
+          </a:blip>
+          <a:stretch>
+            <a:fillRect/>
+          </a:stretch>
+        </p:blipFill>
+        <p:spPr>
+          <a:xfrm flipH="1">
+            <a:off x="2333151" y="4687884"/>
+            <a:ext cx="172865" cy="172865"/>
+          </a:xfrm>
+          <a:prstGeom prst="rect">
+            <a:avLst/>
+          </a:prstGeom>
+        </p:spPr>
+      </p:pic>
+      <p:sp>
+        <p:nvSpPr>
+          <p:cNvPr id="26" name="Rectangle: Rounded Corners 25">
+            <a:extLst>
+              <a:ext uri="{FF2B5EF4-FFF2-40B4-BE49-F238E27FC236}">
+                <a16:creationId xmlns:a16="http://schemas.microsoft.com/office/drawing/2014/main" id="{10A88C7A-B2EF-41F3-8974-6232D8FACCA0}"/>
+              </a:ext>
+            </a:extLst>
+          </p:cNvPr>
+          <p:cNvSpPr/>
+          <p:nvPr/>
+        </p:nvSpPr>
+        <p:spPr>
+          <a:xfrm>
+            <a:off x="1613016" y="5082372"/>
+            <a:ext cx="962759" cy="206062"/>
+          </a:xfrm>
+          <a:prstGeom prst="roundRect">
+            <a:avLst/>
+          </a:prstGeom>
+          <a:solidFill>
+            <a:schemeClr val="accent2"/>
+          </a:solidFill>
+        </p:spPr>
+        <p:style>
+          <a:lnRef idx="2">
+            <a:schemeClr val="accent1">
+              <a:shade val="50000"/>
+            </a:schemeClr>
+          </a:lnRef>
+          <a:fillRef idx="1">
+            <a:schemeClr val="accent1"/>
+          </a:fillRef>
+          <a:effectRef idx="0">
+            <a:schemeClr val="accent1"/>
+          </a:effectRef>
+          <a:fontRef idx="minor">
+            <a:schemeClr val="lt1"/>
+          </a:fontRef>
+        </p:style>
+        <p:txBody>
+          <a:bodyPr rtlCol="0" anchor="ctr"/>
+          <a:lstStyle/>
+          <a:p>
+            <a:r>
+              <a:rPr lang="fa-IR" dirty="0">
+                <a:cs typeface="B Nazanin" panose="00000400000000000000" pitchFamily="2" charset="-78"/>
+              </a:rPr>
+              <a:t>انتخاب</a:t>
+            </a:r>
+            <a:endParaRPr lang="en-US" dirty="0">
+              <a:cs typeface="B Nazanin" panose="00000400000000000000" pitchFamily="2" charset="-78"/>
+            </a:endParaRPr>
+          </a:p>
+        </p:txBody>
+      </p:sp>
+      <p:pic>
+        <p:nvPicPr>
+          <p:cNvPr id="29" name="Picture 28">
+            <a:extLst>
+              <a:ext uri="{FF2B5EF4-FFF2-40B4-BE49-F238E27FC236}">
+                <a16:creationId xmlns:a16="http://schemas.microsoft.com/office/drawing/2014/main" id="{1E68660E-CC8C-476C-984A-83F6EFA9F314}"/>
+              </a:ext>
+            </a:extLst>
+          </p:cNvPr>
+          <p:cNvPicPr>
+            <a:picLocks noChangeAspect="1"/>
+          </p:cNvPicPr>
+          <p:nvPr/>
+        </p:nvPicPr>
+        <p:blipFill>
+          <a:blip r:embed="rId7">
+            <a:extLst>
+              <a:ext uri="{28A0092B-C50C-407E-A947-70E740481C1C}">
+                <a14:useLocalDpi xmlns:a14="http://schemas.microsoft.com/office/drawing/2010/main" val="0"/>
+              </a:ext>
+            </a:extLst>
+          </a:blip>
+          <a:stretch>
+            <a:fillRect/>
+          </a:stretch>
+        </p:blipFill>
+        <p:spPr>
+          <a:xfrm flipH="1">
+            <a:off x="2333151" y="5098970"/>
+            <a:ext cx="172865" cy="172865"/>
+          </a:xfrm>
+          <a:prstGeom prst="rect">
+            <a:avLst/>
+          </a:prstGeom>
+        </p:spPr>
+      </p:pic>
     </p:spTree>
     <p:extLst>
       <p:ext uri="{BB962C8B-B14F-4D97-AF65-F5344CB8AC3E}">
@@ -26846,10 +27189,10 @@
       </p:sp>
       <p:graphicFrame>
         <p:nvGraphicFramePr>
-          <p:cNvPr id="22" name="Table 9">
-            <a:extLst>
-              <a:ext uri="{FF2B5EF4-FFF2-40B4-BE49-F238E27FC236}">
-                <a16:creationId xmlns:a16="http://schemas.microsoft.com/office/drawing/2014/main" id="{7DF113D8-98A3-4795-81AB-86C0CB8C08FC}"/>
+          <p:cNvPr id="23" name="Table 9">
+            <a:extLst>
+              <a:ext uri="{FF2B5EF4-FFF2-40B4-BE49-F238E27FC236}">
+                <a16:creationId xmlns:a16="http://schemas.microsoft.com/office/drawing/2014/main" id="{7B571386-BEB6-4433-BC0C-76587886DC96}"/>
               </a:ext>
             </a:extLst>
           </p:cNvPr>
@@ -26859,14 +27202,14 @@
           <p:nvPr>
             <p:extLst>
               <p:ext uri="{D42A27DB-BD31-4B8C-83A1-F6EECF244321}">
-                <p14:modId xmlns:p14="http://schemas.microsoft.com/office/powerpoint/2010/main" val="308979210"/>
+                <p14:modId xmlns:p14="http://schemas.microsoft.com/office/powerpoint/2010/main" val="158127026"/>
               </p:ext>
             </p:extLst>
           </p:nvPr>
         </p:nvGraphicFramePr>
         <p:xfrm>
           <a:off x="1444514" y="3638319"/>
-          <a:ext cx="8617095" cy="1478280"/>
+          <a:ext cx="8617094" cy="1752600"/>
         </p:xfrm>
         <a:graphic>
           <a:graphicData uri="http://schemas.openxmlformats.org/drawingml/2006/table">
@@ -26875,42 +27218,49 @@
                 <a:tableStyleId>{00A15C55-8517-42AA-B614-E9B94910E393}</a:tableStyleId>
               </a:tblPr>
               <a:tblGrid>
-                <a:gridCol w="1512214">
+                <a:gridCol w="1286454">
+                  <a:extLst>
+                    <a:ext uri="{9D8B030D-6E8A-4147-A177-3AD203B41FA5}">
+                      <a16:colId xmlns:a16="http://schemas.microsoft.com/office/drawing/2014/main" val="145477168"/>
+                    </a:ext>
+                  </a:extLst>
+                </a:gridCol>
+                <a:gridCol w="1286454">
                   <a:extLst>
                     <a:ext uri="{9D8B030D-6E8A-4147-A177-3AD203B41FA5}">
                       <a16:colId xmlns:a16="http://schemas.microsoft.com/office/drawing/2014/main" val="1135019443"/>
                     </a:ext>
                   </a:extLst>
                 </a:gridCol>
-                <a:gridCol w="1644238">
+                <a:gridCol w="1398768">
                   <a:extLst>
                     <a:ext uri="{9D8B030D-6E8A-4147-A177-3AD203B41FA5}">
                       <a16:colId xmlns:a16="http://schemas.microsoft.com/office/drawing/2014/main" val="109007189"/>
                     </a:ext>
                   </a:extLst>
                 </a:gridCol>
-                <a:gridCol w="1378040">
+                <a:gridCol w="1172311">
                   <a:extLst>
                     <a:ext uri="{9D8B030D-6E8A-4147-A177-3AD203B41FA5}">
                       <a16:colId xmlns:a16="http://schemas.microsoft.com/office/drawing/2014/main" val="1334342954"/>
                     </a:ext>
                   </a:extLst>
                 </a:gridCol>
-                <a:gridCol w="1545464">
+                <a:gridCol w="1314740">
                   <a:extLst>
                     <a:ext uri="{9D8B030D-6E8A-4147-A177-3AD203B41FA5}">
                       <a16:colId xmlns:a16="http://schemas.microsoft.com/office/drawing/2014/main" val="2375800834"/>
                     </a:ext>
                   </a:extLst>
                 </a:gridCol>
-                <a:gridCol w="1068947">
+                <a:gridCol w="909363">
                   <a:extLst>
                     <a:ext uri="{9D8B030D-6E8A-4147-A177-3AD203B41FA5}">
                       <a16:colId xmlns:a16="http://schemas.microsoft.com/office/drawing/2014/main" val="358340357"/>
                     </a:ext>
                   </a:extLst>
                 </a:gridCol>
-                <a:gridCol w="1468192">
+                <a:gridCol w="1249004">
                   <a:extLst>
                     <a:ext uri="{9D8B030D-6E8A-4147-A177-3AD203B41FA5}">
                       <a16:colId xmlns:a16="http://schemas.microsoft.com/office/drawing/2014/main" val="822705198"/>
@@ -26919,6 +27269,35 @@
                 </a:gridCol>
               </a:tblGrid>
               <a:tr h="0">
+                <a:tc>
+                  <a:txBody>
+                    <a:bodyPr/>
+                    <a:lstStyle/>
+                    <a:p>
+                      <a:pPr algn="ctr"/>
+                      <a:r>
+                        <a:rPr lang="fa-IR" dirty="0">
+                          <a:solidFill>
+                            <a:schemeClr val="bg2">
+                              <a:lumMod val="10000"/>
+                            </a:schemeClr>
+                          </a:solidFill>
+                          <a:cs typeface="B Nazanin" panose="00000400000000000000" pitchFamily="2" charset="-78"/>
+                        </a:rPr>
+                        <a:t>ویرایش/حذف</a:t>
+                      </a:r>
+                      <a:endParaRPr lang="en-US" dirty="0">
+                        <a:solidFill>
+                          <a:schemeClr val="bg2">
+                            <a:lumMod val="10000"/>
+                          </a:schemeClr>
+                        </a:solidFill>
+                        <a:cs typeface="B Nazanin" panose="00000400000000000000" pitchFamily="2" charset="-78"/>
+                      </a:endParaRPr>
+                    </a:p>
+                  </a:txBody>
+                  <a:tcPr/>
+                </a:tc>
                 <a:tc>
                   <a:txBody>
                     <a:bodyPr/>
@@ -27106,6 +27485,19 @@
                     <a:lstStyle/>
                     <a:p>
                       <a:pPr algn="ctr"/>
+                      <a:endParaRPr lang="en-US" dirty="0">
+                        <a:cs typeface="B Nazanin" panose="00000400000000000000" pitchFamily="2" charset="-78"/>
+                      </a:endParaRPr>
+                    </a:p>
+                  </a:txBody>
+                  <a:tcPr/>
+                </a:tc>
+                <a:tc>
+                  <a:txBody>
+                    <a:bodyPr/>
+                    <a:lstStyle/>
+                    <a:p>
+                      <a:pPr algn="ctr"/>
                       <a:r>
                         <a:rPr lang="fa-IR" dirty="0">
                           <a:cs typeface="B Nazanin" panose="00000400000000000000" pitchFamily="2" charset="-78"/>
@@ -27227,6 +27619,19 @@
                     <a:lstStyle/>
                     <a:p>
                       <a:pPr algn="ctr"/>
+                      <a:endParaRPr lang="en-US" dirty="0">
+                        <a:cs typeface="B Nazanin" panose="00000400000000000000" pitchFamily="2" charset="-78"/>
+                      </a:endParaRPr>
+                    </a:p>
+                  </a:txBody>
+                  <a:tcPr/>
+                </a:tc>
+                <a:tc>
+                  <a:txBody>
+                    <a:bodyPr/>
+                    <a:lstStyle/>
+                    <a:p>
+                      <a:pPr algn="ctr"/>
                       <a:r>
                         <a:rPr lang="fa-IR" dirty="0">
                           <a:cs typeface="B Nazanin" panose="00000400000000000000" pitchFamily="2" charset="-78"/>
@@ -27342,6 +27747,19 @@
                 </a:extLst>
               </a:tr>
               <a:tr h="370840">
+                <a:tc>
+                  <a:txBody>
+                    <a:bodyPr/>
+                    <a:lstStyle/>
+                    <a:p>
+                      <a:pPr algn="ctr"/>
+                      <a:endParaRPr lang="en-US" dirty="0">
+                        <a:cs typeface="B Nazanin" panose="00000400000000000000" pitchFamily="2" charset="-78"/>
+                      </a:endParaRPr>
+                    </a:p>
+                  </a:txBody>
+                  <a:tcPr/>
+                </a:tc>
                 <a:tc gridSpan="3">
                   <a:txBody>
                     <a:bodyPr/>
@@ -27442,6 +27860,282 @@
           </a:graphicData>
         </a:graphic>
       </p:graphicFrame>
+      <p:sp>
+        <p:nvSpPr>
+          <p:cNvPr id="24" name="Rectangle: Rounded Corners 23">
+            <a:extLst>
+              <a:ext uri="{FF2B5EF4-FFF2-40B4-BE49-F238E27FC236}">
+                <a16:creationId xmlns:a16="http://schemas.microsoft.com/office/drawing/2014/main" id="{AB81C044-A696-4556-8A9F-0909C9F73F1A}"/>
+              </a:ext>
+            </a:extLst>
+          </p:cNvPr>
+          <p:cNvSpPr/>
+          <p:nvPr/>
+        </p:nvSpPr>
+        <p:spPr>
+          <a:xfrm>
+            <a:off x="1613016" y="4327301"/>
+            <a:ext cx="962759" cy="206062"/>
+          </a:xfrm>
+          <a:prstGeom prst="roundRect">
+            <a:avLst/>
+          </a:prstGeom>
+          <a:solidFill>
+            <a:schemeClr val="accent2"/>
+          </a:solidFill>
+        </p:spPr>
+        <p:style>
+          <a:lnRef idx="2">
+            <a:schemeClr val="accent1">
+              <a:shade val="50000"/>
+            </a:schemeClr>
+          </a:lnRef>
+          <a:fillRef idx="1">
+            <a:schemeClr val="accent1"/>
+          </a:fillRef>
+          <a:effectRef idx="0">
+            <a:schemeClr val="accent1"/>
+          </a:effectRef>
+          <a:fontRef idx="minor">
+            <a:schemeClr val="lt1"/>
+          </a:fontRef>
+        </p:style>
+        <p:txBody>
+          <a:bodyPr rtlCol="0" anchor="ctr"/>
+          <a:lstStyle/>
+          <a:p>
+            <a:r>
+              <a:rPr lang="fa-IR" dirty="0">
+                <a:cs typeface="B Nazanin" panose="00000400000000000000" pitchFamily="2" charset="-78"/>
+              </a:rPr>
+              <a:t>انتخاب</a:t>
+            </a:r>
+            <a:endParaRPr lang="en-US" dirty="0">
+              <a:cs typeface="B Nazanin" panose="00000400000000000000" pitchFamily="2" charset="-78"/>
+            </a:endParaRPr>
+          </a:p>
+        </p:txBody>
+      </p:sp>
+      <p:pic>
+        <p:nvPicPr>
+          <p:cNvPr id="26" name="Picture 25">
+            <a:extLst>
+              <a:ext uri="{FF2B5EF4-FFF2-40B4-BE49-F238E27FC236}">
+                <a16:creationId xmlns:a16="http://schemas.microsoft.com/office/drawing/2014/main" id="{9D51EAC2-E581-4E5F-8339-BEEF184E531A}"/>
+              </a:ext>
+            </a:extLst>
+          </p:cNvPr>
+          <p:cNvPicPr>
+            <a:picLocks noChangeAspect="1"/>
+          </p:cNvPicPr>
+          <p:nvPr/>
+        </p:nvPicPr>
+        <p:blipFill>
+          <a:blip r:embed="rId7">
+            <a:extLst>
+              <a:ext uri="{28A0092B-C50C-407E-A947-70E740481C1C}">
+                <a14:useLocalDpi xmlns:a14="http://schemas.microsoft.com/office/drawing/2010/main" val="0"/>
+              </a:ext>
+            </a:extLst>
+          </a:blip>
+          <a:stretch>
+            <a:fillRect/>
+          </a:stretch>
+        </p:blipFill>
+        <p:spPr>
+          <a:xfrm flipH="1">
+            <a:off x="2333151" y="4343899"/>
+            <a:ext cx="172865" cy="172865"/>
+          </a:xfrm>
+          <a:prstGeom prst="rect">
+            <a:avLst/>
+          </a:prstGeom>
+        </p:spPr>
+      </p:pic>
+      <p:sp>
+        <p:nvSpPr>
+          <p:cNvPr id="29" name="Rectangle: Rounded Corners 28">
+            <a:extLst>
+              <a:ext uri="{FF2B5EF4-FFF2-40B4-BE49-F238E27FC236}">
+                <a16:creationId xmlns:a16="http://schemas.microsoft.com/office/drawing/2014/main" id="{BA2809B5-8A94-470C-9C33-DF5AA94F0468}"/>
+              </a:ext>
+            </a:extLst>
+          </p:cNvPr>
+          <p:cNvSpPr/>
+          <p:nvPr/>
+        </p:nvSpPr>
+        <p:spPr>
+          <a:xfrm>
+            <a:off x="1613016" y="4671286"/>
+            <a:ext cx="962759" cy="206062"/>
+          </a:xfrm>
+          <a:prstGeom prst="roundRect">
+            <a:avLst/>
+          </a:prstGeom>
+          <a:solidFill>
+            <a:schemeClr val="accent2"/>
+          </a:solidFill>
+        </p:spPr>
+        <p:style>
+          <a:lnRef idx="2">
+            <a:schemeClr val="accent1">
+              <a:shade val="50000"/>
+            </a:schemeClr>
+          </a:lnRef>
+          <a:fillRef idx="1">
+            <a:schemeClr val="accent1"/>
+          </a:fillRef>
+          <a:effectRef idx="0">
+            <a:schemeClr val="accent1"/>
+          </a:effectRef>
+          <a:fontRef idx="minor">
+            <a:schemeClr val="lt1"/>
+          </a:fontRef>
+        </p:style>
+        <p:txBody>
+          <a:bodyPr rtlCol="0" anchor="ctr"/>
+          <a:lstStyle/>
+          <a:p>
+            <a:r>
+              <a:rPr lang="fa-IR" dirty="0">
+                <a:cs typeface="B Nazanin" panose="00000400000000000000" pitchFamily="2" charset="-78"/>
+              </a:rPr>
+              <a:t>انتخاب</a:t>
+            </a:r>
+            <a:endParaRPr lang="en-US" dirty="0">
+              <a:cs typeface="B Nazanin" panose="00000400000000000000" pitchFamily="2" charset="-78"/>
+            </a:endParaRPr>
+          </a:p>
+        </p:txBody>
+      </p:sp>
+      <p:pic>
+        <p:nvPicPr>
+          <p:cNvPr id="30" name="Picture 29">
+            <a:extLst>
+              <a:ext uri="{FF2B5EF4-FFF2-40B4-BE49-F238E27FC236}">
+                <a16:creationId xmlns:a16="http://schemas.microsoft.com/office/drawing/2014/main" id="{59A9C7EF-46BB-4922-8F7B-B303B793A685}"/>
+              </a:ext>
+            </a:extLst>
+          </p:cNvPr>
+          <p:cNvPicPr>
+            <a:picLocks noChangeAspect="1"/>
+          </p:cNvPicPr>
+          <p:nvPr/>
+        </p:nvPicPr>
+        <p:blipFill>
+          <a:blip r:embed="rId7">
+            <a:extLst>
+              <a:ext uri="{28A0092B-C50C-407E-A947-70E740481C1C}">
+                <a14:useLocalDpi xmlns:a14="http://schemas.microsoft.com/office/drawing/2010/main" val="0"/>
+              </a:ext>
+            </a:extLst>
+          </a:blip>
+          <a:stretch>
+            <a:fillRect/>
+          </a:stretch>
+        </p:blipFill>
+        <p:spPr>
+          <a:xfrm flipH="1">
+            <a:off x="2333151" y="4687884"/>
+            <a:ext cx="172865" cy="172865"/>
+          </a:xfrm>
+          <a:prstGeom prst="rect">
+            <a:avLst/>
+          </a:prstGeom>
+        </p:spPr>
+      </p:pic>
+      <p:sp>
+        <p:nvSpPr>
+          <p:cNvPr id="31" name="Rectangle: Rounded Corners 30">
+            <a:extLst>
+              <a:ext uri="{FF2B5EF4-FFF2-40B4-BE49-F238E27FC236}">
+                <a16:creationId xmlns:a16="http://schemas.microsoft.com/office/drawing/2014/main" id="{4910F411-0807-4F0A-92D4-5EB140EEBE8E}"/>
+              </a:ext>
+            </a:extLst>
+          </p:cNvPr>
+          <p:cNvSpPr/>
+          <p:nvPr/>
+        </p:nvSpPr>
+        <p:spPr>
+          <a:xfrm>
+            <a:off x="1613016" y="5082372"/>
+            <a:ext cx="962759" cy="206062"/>
+          </a:xfrm>
+          <a:prstGeom prst="roundRect">
+            <a:avLst/>
+          </a:prstGeom>
+          <a:solidFill>
+            <a:schemeClr val="accent2"/>
+          </a:solidFill>
+        </p:spPr>
+        <p:style>
+          <a:lnRef idx="2">
+            <a:schemeClr val="accent1">
+              <a:shade val="50000"/>
+            </a:schemeClr>
+          </a:lnRef>
+          <a:fillRef idx="1">
+            <a:schemeClr val="accent1"/>
+          </a:fillRef>
+          <a:effectRef idx="0">
+            <a:schemeClr val="accent1"/>
+          </a:effectRef>
+          <a:fontRef idx="minor">
+            <a:schemeClr val="lt1"/>
+          </a:fontRef>
+        </p:style>
+        <p:txBody>
+          <a:bodyPr rtlCol="0" anchor="ctr"/>
+          <a:lstStyle/>
+          <a:p>
+            <a:r>
+              <a:rPr lang="fa-IR" dirty="0">
+                <a:cs typeface="B Nazanin" panose="00000400000000000000" pitchFamily="2" charset="-78"/>
+              </a:rPr>
+              <a:t>انتخاب</a:t>
+            </a:r>
+            <a:endParaRPr lang="en-US" dirty="0">
+              <a:cs typeface="B Nazanin" panose="00000400000000000000" pitchFamily="2" charset="-78"/>
+            </a:endParaRPr>
+          </a:p>
+        </p:txBody>
+      </p:sp>
+      <p:pic>
+        <p:nvPicPr>
+          <p:cNvPr id="32" name="Picture 31">
+            <a:extLst>
+              <a:ext uri="{FF2B5EF4-FFF2-40B4-BE49-F238E27FC236}">
+                <a16:creationId xmlns:a16="http://schemas.microsoft.com/office/drawing/2014/main" id="{550B6963-005B-432B-9CCB-1010470898E9}"/>
+              </a:ext>
+            </a:extLst>
+          </p:cNvPr>
+          <p:cNvPicPr>
+            <a:picLocks noChangeAspect="1"/>
+          </p:cNvPicPr>
+          <p:nvPr/>
+        </p:nvPicPr>
+        <p:blipFill>
+          <a:blip r:embed="rId7">
+            <a:extLst>
+              <a:ext uri="{28A0092B-C50C-407E-A947-70E740481C1C}">
+                <a14:useLocalDpi xmlns:a14="http://schemas.microsoft.com/office/drawing/2010/main" val="0"/>
+              </a:ext>
+            </a:extLst>
+          </a:blip>
+          <a:stretch>
+            <a:fillRect/>
+          </a:stretch>
+        </p:blipFill>
+        <p:spPr>
+          <a:xfrm flipH="1">
+            <a:off x="2333151" y="5098970"/>
+            <a:ext cx="172865" cy="172865"/>
+          </a:xfrm>
+          <a:prstGeom prst="rect">
+            <a:avLst/>
+          </a:prstGeom>
+        </p:spPr>
+      </p:pic>
     </p:spTree>
     <p:extLst>
       <p:ext uri="{BB962C8B-B14F-4D97-AF65-F5344CB8AC3E}">
@@ -34909,7 +35603,7 @@
           <p:nvPr>
             <p:extLst>
               <p:ext uri="{D42A27DB-BD31-4B8C-83A1-F6EECF244321}">
-                <p14:modId xmlns:p14="http://schemas.microsoft.com/office/powerpoint/2010/main" val="3978415557"/>
+                <p14:modId xmlns:p14="http://schemas.microsoft.com/office/powerpoint/2010/main" val="2668942102"/>
               </p:ext>
             </p:extLst>
           </p:nvPr>

</xml_diff>